<commit_message>
Updated Project Status Report 1
</commit_message>
<xml_diff>
--- a/Project Status Report 1.pptx
+++ b/Project Status Report 1.pptx
@@ -5,17 +5,18 @@
     <p:sldMasterId id="2147483648" r:id="rId2"/>
   </p:sldMasterIdLst>
   <p:notesMasterIdLst>
-    <p:notesMasterId r:id="rId11"/>
+    <p:notesMasterId r:id="rId12"/>
   </p:notesMasterIdLst>
   <p:sldIdLst>
     <p:sldId id="259" r:id="rId3"/>
     <p:sldId id="261" r:id="rId4"/>
     <p:sldId id="271" r:id="rId5"/>
     <p:sldId id="272" r:id="rId6"/>
-    <p:sldId id="269" r:id="rId7"/>
-    <p:sldId id="262" r:id="rId8"/>
-    <p:sldId id="267" r:id="rId9"/>
-    <p:sldId id="274" r:id="rId10"/>
+    <p:sldId id="275" r:id="rId7"/>
+    <p:sldId id="269" r:id="rId8"/>
+    <p:sldId id="262" r:id="rId9"/>
+    <p:sldId id="267" r:id="rId10"/>
+    <p:sldId id="274" r:id="rId11"/>
   </p:sldIdLst>
   <p:sldSz cx="9144000" cy="6858000" type="screen4x3"/>
   <p:notesSz cx="6858000" cy="9144000"/>
@@ -131,6 +132,7 @@
         </p14:section>
         <p14:section name="Status Update" id="{521DEF98-8796-4632-831A-16252E9A6054}">
           <p14:sldIdLst>
+            <p14:sldId id="275"/>
             <p14:sldId id="269"/>
             <p14:sldId id="262"/>
           </p14:sldIdLst>
@@ -253,7 +255,7 @@
           <a:p>
             <a:fld id="{724506C0-3FFE-45A5-803D-9F4FC5464A70}" type="datetimeFigureOut">
               <a:rPr lang="en-US" smtClean="0"/>
-              <a:t>3/10/2016</a:t>
+              <a:t>3/12/2016</a:t>
             </a:fld>
             <a:endParaRPr lang="en-US"/>
           </a:p>
@@ -1000,7 +1002,7 @@
             <a:fld id="{5E0C3846-8D4C-4326-8BC7-9B455A036298}" type="slidenum">
               <a:rPr lang="en-US" smtClean="0"/>
               <a:pPr/>
-              <a:t>6</a:t>
+              <a:t>7</a:t>
             </a:fld>
             <a:endParaRPr lang="en-US"/>
           </a:p>
@@ -1113,7 +1115,7 @@
             <a:fld id="{5E0C3846-8D4C-4326-8BC7-9B455A036298}" type="slidenum">
               <a:rPr lang="en-US" smtClean="0"/>
               <a:pPr/>
-              <a:t>8</a:t>
+              <a:t>9</a:t>
             </a:fld>
             <a:endParaRPr lang="en-US"/>
           </a:p>
@@ -1467,7 +1469,7 @@
           <a:p>
             <a:fld id="{F922158D-428B-4987-8B28-745A2AFA1252}" type="datetimeFigureOut">
               <a:rPr lang="en-US" smtClean="0"/>
-              <a:t>3/10/2016</a:t>
+              <a:t>3/12/2016</a:t>
             </a:fld>
             <a:endParaRPr lang="en-US"/>
           </a:p>
@@ -2060,7 +2062,7 @@
           <a:p>
             <a:fld id="{F922158D-428B-4987-8B28-745A2AFA1252}" type="datetimeFigureOut">
               <a:rPr lang="en-US" smtClean="0"/>
-              <a:t>3/10/2016</a:t>
+              <a:t>3/12/2016</a:t>
             </a:fld>
             <a:endParaRPr lang="en-US"/>
           </a:p>
@@ -2245,7 +2247,7 @@
           <a:p>
             <a:fld id="{F922158D-428B-4987-8B28-745A2AFA1252}" type="datetimeFigureOut">
               <a:rPr lang="en-US" smtClean="0"/>
-              <a:t>3/10/2016</a:t>
+              <a:t>3/12/2016</a:t>
             </a:fld>
             <a:endParaRPr lang="en-US"/>
           </a:p>
@@ -2561,7 +2563,7 @@
           <a:p>
             <a:fld id="{F922158D-428B-4987-8B28-745A2AFA1252}" type="datetimeFigureOut">
               <a:rPr lang="en-US" smtClean="0"/>
-              <a:t>3/10/2016</a:t>
+              <a:t>3/12/2016</a:t>
             </a:fld>
             <a:endParaRPr lang="en-US"/>
           </a:p>
@@ -2990,7 +2992,7 @@
           <a:p>
             <a:fld id="{F922158D-428B-4987-8B28-745A2AFA1252}" type="datetimeFigureOut">
               <a:rPr lang="en-US" smtClean="0"/>
-              <a:t>3/10/2016</a:t>
+              <a:t>3/12/2016</a:t>
             </a:fld>
             <a:endParaRPr lang="en-US"/>
           </a:p>
@@ -3287,7 +3289,7 @@
           <a:p>
             <a:fld id="{F922158D-428B-4987-8B28-745A2AFA1252}" type="datetimeFigureOut">
               <a:rPr lang="en-US" smtClean="0"/>
-              <a:t>3/10/2016</a:t>
+              <a:t>3/12/2016</a:t>
             </a:fld>
             <a:endParaRPr lang="en-US"/>
           </a:p>
@@ -3727,7 +3729,7 @@
           <a:p>
             <a:fld id="{F922158D-428B-4987-8B28-745A2AFA1252}" type="datetimeFigureOut">
               <a:rPr lang="en-US" smtClean="0"/>
-              <a:t>3/10/2016</a:t>
+              <a:t>3/12/2016</a:t>
             </a:fld>
             <a:endParaRPr lang="en-US"/>
           </a:p>
@@ -3856,7 +3858,7 @@
           <a:p>
             <a:fld id="{F922158D-428B-4987-8B28-745A2AFA1252}" type="datetimeFigureOut">
               <a:rPr lang="en-US" smtClean="0"/>
-              <a:t>3/10/2016</a:t>
+              <a:t>3/12/2016</a:t>
             </a:fld>
             <a:endParaRPr lang="en-US"/>
           </a:p>
@@ -3956,7 +3958,7 @@
           <a:p>
             <a:fld id="{F922158D-428B-4987-8B28-745A2AFA1252}" type="datetimeFigureOut">
               <a:rPr lang="en-US" smtClean="0"/>
-              <a:t>3/10/2016</a:t>
+              <a:t>3/12/2016</a:t>
             </a:fld>
             <a:endParaRPr lang="en-US"/>
           </a:p>
@@ -4240,7 +4242,7 @@
           <a:p>
             <a:fld id="{F922158D-428B-4987-8B28-745A2AFA1252}" type="datetimeFigureOut">
               <a:rPr lang="en-US" smtClean="0"/>
-              <a:t>3/10/2016</a:t>
+              <a:t>3/12/2016</a:t>
             </a:fld>
             <a:endParaRPr lang="en-US"/>
           </a:p>
@@ -4502,7 +4504,7 @@
           <a:p>
             <a:fld id="{F922158D-428B-4987-8B28-745A2AFA1252}" type="datetimeFigureOut">
               <a:rPr lang="en-US" smtClean="0"/>
-              <a:t>3/10/2016</a:t>
+              <a:t>3/12/2016</a:t>
             </a:fld>
             <a:endParaRPr lang="en-US"/>
           </a:p>
@@ -4720,7 +4722,7 @@
           <a:p>
             <a:fld id="{F922158D-428B-4987-8B28-745A2AFA1252}" type="datetimeFigureOut">
               <a:rPr lang="en-US" smtClean="0"/>
-              <a:t>3/10/2016</a:t>
+              <a:t>3/12/2016</a:t>
             </a:fld>
             <a:endParaRPr lang="en-US"/>
           </a:p>
@@ -5149,11 +5151,7 @@
           <a:p>
             <a:r>
               <a:rPr lang="en-US" dirty="0" smtClean="0"/>
-              <a:t>Project Status </a:t>
-            </a:r>
-            <a:r>
-              <a:rPr lang="en-US" dirty="0" smtClean="0"/>
-              <a:t>Report 1</a:t>
+              <a:t>Project Status Report 1</a:t>
             </a:r>
             <a:endParaRPr lang="en-US" dirty="0"/>
           </a:p>
@@ -5357,7 +5355,7 @@
         </p:blipFill>
         <p:spPr>
           <a:xfrm>
-            <a:off x="5168900" y="609600"/>
+            <a:off x="4953000" y="1360918"/>
             <a:ext cx="4000500" cy="3228975"/>
           </a:xfrm>
           <a:prstGeom prst="rect">
@@ -7200,6 +7198,106 @@
           <a:p>
             <a:r>
               <a:rPr lang="en-US" dirty="0" smtClean="0"/>
+              <a:t>Technology </a:t>
+            </a:r>
+            <a:r>
+              <a:rPr lang="en-US" dirty="0" smtClean="0"/>
+              <a:t>Requirements</a:t>
+            </a:r>
+            <a:endParaRPr lang="en-US" dirty="0"/>
+          </a:p>
+        </p:txBody>
+      </p:sp>
+      <p:sp>
+        <p:nvSpPr>
+          <p:cNvPr id="3" name="Content Placeholder 2"/>
+          <p:cNvSpPr>
+            <a:spLocks noGrp="1"/>
+          </p:cNvSpPr>
+          <p:nvPr>
+            <p:ph idx="1"/>
+          </p:nvPr>
+        </p:nvSpPr>
+        <p:spPr/>
+        <p:txBody>
+          <a:bodyPr>
+            <a:normAutofit/>
+          </a:bodyPr>
+          <a:lstStyle/>
+          <a:p>
+            <a:pPr marL="0" indent="0">
+              <a:buNone/>
+            </a:pPr>
+            <a:r>
+              <a:rPr lang="en-US" b="1" dirty="0" smtClean="0"/>
+              <a:t>ASP .NET</a:t>
+            </a:r>
+          </a:p>
+          <a:p>
+            <a:r>
+              <a:rPr lang="en-US" sz="1600" dirty="0" smtClean="0"/>
+              <a:t>Version 4.6.1 </a:t>
+            </a:r>
+          </a:p>
+          <a:p>
+            <a:r>
+              <a:rPr lang="en-US" sz="1600" dirty="0" smtClean="0"/>
+              <a:t>MVC 5</a:t>
+            </a:r>
+            <a:endParaRPr lang="en-US" sz="1600" dirty="0"/>
+          </a:p>
+        </p:txBody>
+      </p:sp>
+    </p:spTree>
+    <p:extLst>
+      <p:ext uri="{BB962C8B-B14F-4D97-AF65-F5344CB8AC3E}">
+        <p14:creationId xmlns:p14="http://schemas.microsoft.com/office/powerpoint/2010/main" val="3985448942"/>
+      </p:ext>
+    </p:extLst>
+  </p:cSld>
+  <p:clrMapOvr>
+    <a:masterClrMapping/>
+  </p:clrMapOvr>
+  <p:transition spd="slow">
+    <p:fade/>
+  </p:transition>
+</p:sld>
+</file>
+
+<file path=ppt/slides/slide6.xml><?xml version="1.0" encoding="utf-8"?>
+<p:sld xmlns:a="http://schemas.openxmlformats.org/drawingml/2006/main" xmlns:r="http://schemas.openxmlformats.org/officeDocument/2006/relationships" xmlns:p="http://schemas.openxmlformats.org/presentationml/2006/main">
+  <p:cSld>
+    <p:spTree>
+      <p:nvGrpSpPr>
+        <p:cNvPr id="1" name=""/>
+        <p:cNvGrpSpPr/>
+        <p:nvPr/>
+      </p:nvGrpSpPr>
+      <p:grpSpPr>
+        <a:xfrm>
+          <a:off x="0" y="0"/>
+          <a:ext cx="0" cy="0"/>
+          <a:chOff x="0" y="0"/>
+          <a:chExt cx="0" cy="0"/>
+        </a:xfrm>
+      </p:grpSpPr>
+      <p:sp>
+        <p:nvSpPr>
+          <p:cNvPr id="2" name="Title 1"/>
+          <p:cNvSpPr>
+            <a:spLocks noGrp="1"/>
+          </p:cNvSpPr>
+          <p:nvPr>
+            <p:ph type="title"/>
+          </p:nvPr>
+        </p:nvSpPr>
+        <p:spPr/>
+        <p:txBody>
+          <a:bodyPr/>
+          <a:lstStyle/>
+          <a:p>
+            <a:r>
+              <a:rPr lang="en-US" dirty="0" smtClean="0"/>
               <a:t>Progress Chart</a:t>
             </a:r>
             <a:endParaRPr lang="en-US" dirty="0"/>
@@ -7252,171 +7350,6 @@
 </p:sld>
 </file>
 
-<file path=ppt/slides/slide6.xml><?xml version="1.0" encoding="utf-8"?>
-<p:sld xmlns:a="http://schemas.openxmlformats.org/drawingml/2006/main" xmlns:r="http://schemas.openxmlformats.org/officeDocument/2006/relationships" xmlns:p="http://schemas.openxmlformats.org/presentationml/2006/main">
-  <p:cSld>
-    <p:spTree>
-      <p:nvGrpSpPr>
-        <p:cNvPr id="1" name=""/>
-        <p:cNvGrpSpPr/>
-        <p:nvPr/>
-      </p:nvGrpSpPr>
-      <p:grpSpPr>
-        <a:xfrm>
-          <a:off x="0" y="0"/>
-          <a:ext cx="0" cy="0"/>
-          <a:chOff x="0" y="0"/>
-          <a:chExt cx="0" cy="0"/>
-        </a:xfrm>
-      </p:grpSpPr>
-      <p:sp>
-        <p:nvSpPr>
-          <p:cNvPr id="2" name="Title 1"/>
-          <p:cNvSpPr>
-            <a:spLocks noGrp="1"/>
-          </p:cNvSpPr>
-          <p:nvPr>
-            <p:ph type="title"/>
-            <p:custDataLst>
-              <p:tags r:id="rId2"/>
-            </p:custDataLst>
-          </p:nvPr>
-        </p:nvSpPr>
-        <p:spPr/>
-        <p:txBody>
-          <a:bodyPr/>
-          <a:lstStyle/>
-          <a:p>
-            <a:r>
-              <a:rPr lang="en-US" dirty="0" smtClean="0"/>
-              <a:t>Current Status</a:t>
-            </a:r>
-            <a:endParaRPr lang="en-US" dirty="0"/>
-          </a:p>
-        </p:txBody>
-      </p:sp>
-      <p:sp>
-        <p:nvSpPr>
-          <p:cNvPr id="4" name="Content Placeholder 3"/>
-          <p:cNvSpPr>
-            <a:spLocks noGrp="1"/>
-          </p:cNvSpPr>
-          <p:nvPr>
-            <p:ph idx="1"/>
-          </p:nvPr>
-        </p:nvSpPr>
-        <p:spPr/>
-        <p:txBody>
-          <a:bodyPr/>
-          <a:lstStyle/>
-          <a:p>
-            <a:pPr>
-              <a:lnSpc>
-                <a:spcPct val="150000"/>
-              </a:lnSpc>
-            </a:pPr>
-            <a:r>
-              <a:rPr lang="en-US" dirty="0"/>
-              <a:t>What progress has been made since the previous milestone?</a:t>
-            </a:r>
-          </a:p>
-          <a:p>
-            <a:pPr lvl="1">
-              <a:lnSpc>
-                <a:spcPct val="150000"/>
-              </a:lnSpc>
-            </a:pPr>
-            <a:r>
-              <a:rPr lang="en-US" dirty="0" smtClean="0"/>
-              <a:t>EHR Plugin Architecture Defined</a:t>
-            </a:r>
-          </a:p>
-          <a:p>
-            <a:pPr lvl="1">
-              <a:lnSpc>
-                <a:spcPct val="150000"/>
-              </a:lnSpc>
-            </a:pPr>
-            <a:r>
-              <a:rPr lang="en-US" dirty="0" smtClean="0"/>
-              <a:t>Database Design Detailed</a:t>
-            </a:r>
-          </a:p>
-          <a:p>
-            <a:pPr lvl="1">
-              <a:lnSpc>
-                <a:spcPct val="150000"/>
-              </a:lnSpc>
-            </a:pPr>
-            <a:r>
-              <a:rPr lang="en-US" dirty="0" smtClean="0"/>
-              <a:t>Research into Target Platforms and Data Sources (FHIR requests, etc.) – at approximately 55% complete</a:t>
-            </a:r>
-          </a:p>
-          <a:p>
-            <a:pPr lvl="1">
-              <a:lnSpc>
-                <a:spcPct val="150000"/>
-              </a:lnSpc>
-            </a:pPr>
-            <a:r>
-              <a:rPr lang="en-US" dirty="0" smtClean="0"/>
-              <a:t>Prototype EHR ~ 40% complete</a:t>
-            </a:r>
-            <a:endParaRPr lang="en-US" dirty="0"/>
-          </a:p>
-          <a:p>
-            <a:pPr>
-              <a:lnSpc>
-                <a:spcPct val="150000"/>
-              </a:lnSpc>
-            </a:pPr>
-            <a:r>
-              <a:rPr lang="en-US" dirty="0"/>
-              <a:t>Is the project currently ahead of schedule, on track, or delayed?</a:t>
-            </a:r>
-          </a:p>
-          <a:p>
-            <a:pPr lvl="1">
-              <a:lnSpc>
-                <a:spcPct val="150000"/>
-              </a:lnSpc>
-            </a:pPr>
-            <a:r>
-              <a:rPr lang="en-US" b="1" dirty="0" smtClean="0"/>
-              <a:t>ON TRACK</a:t>
-            </a:r>
-            <a:endParaRPr lang="en-US" b="1" dirty="0"/>
-          </a:p>
-          <a:p>
-            <a:pPr marL="0" indent="0">
-              <a:buNone/>
-            </a:pPr>
-            <a:endParaRPr lang="en-US" dirty="0"/>
-          </a:p>
-        </p:txBody>
-      </p:sp>
-    </p:spTree>
-    <p:custDataLst>
-      <p:tags r:id="rId1"/>
-    </p:custDataLst>
-  </p:cSld>
-  <p:clrMapOvr>
-    <a:masterClrMapping/>
-  </p:clrMapOvr>
-  <p:transition spd="slow">
-    <p:fade/>
-  </p:transition>
-  <p:timing>
-    <p:tnLst>
-      <p:par>
-        <p:cTn id="1" dur="indefinite" restart="never" nodeType="tmRoot"/>
-      </p:par>
-    </p:tnLst>
-  </p:timing>
-</p:sld>
-</file>
-
 <file path=ppt/slides/slide7.xml><?xml version="1.0" encoding="utf-8"?>
 <p:sld xmlns:a="http://schemas.openxmlformats.org/drawingml/2006/main" xmlns:r="http://schemas.openxmlformats.org/officeDocument/2006/relationships" xmlns:p="http://schemas.openxmlformats.org/presentationml/2006/main">
   <p:cSld>
@@ -7447,72 +7380,30 @@
             </p:custDataLst>
           </p:nvPr>
         </p:nvSpPr>
-        <p:spPr>
-          <a:xfrm>
-            <a:off x="457200" y="914400"/>
-            <a:ext cx="5410200" cy="914400"/>
-          </a:xfrm>
-        </p:spPr>
+        <p:spPr/>
         <p:txBody>
           <a:bodyPr/>
           <a:lstStyle/>
           <a:p>
             <a:r>
               <a:rPr lang="en-US" dirty="0" smtClean="0"/>
-              <a:t>Looking Ahead</a:t>
+              <a:t>Current Status</a:t>
             </a:r>
             <a:endParaRPr lang="en-US" dirty="0"/>
           </a:p>
         </p:txBody>
       </p:sp>
-      <p:pic>
-        <p:nvPicPr>
-          <p:cNvPr id="4" name="Picture 3"/>
-          <p:cNvPicPr>
-            <a:picLocks noChangeAspect="1"/>
-          </p:cNvPicPr>
-          <p:nvPr/>
-        </p:nvPicPr>
-        <p:blipFill rotWithShape="1">
-          <a:blip r:embed="rId5" cstate="email">
-            <a:extLst>
-              <a:ext uri="{28A0092B-C50C-407E-A947-70E740481C1C}">
-                <a14:useLocalDpi xmlns:a14="http://schemas.microsoft.com/office/drawing/2010/main"/>
-              </a:ext>
-            </a:extLst>
-          </a:blip>
-          <a:srcRect/>
-          <a:stretch/>
-        </p:blipFill>
-        <p:spPr>
-          <a:xfrm>
-            <a:off x="6065520" y="0"/>
-            <a:ext cx="3078480" cy="6858000"/>
-          </a:xfrm>
-          <a:prstGeom prst="rect">
-            <a:avLst/>
-          </a:prstGeom>
-        </p:spPr>
-      </p:pic>
-      <p:sp>
-        <p:nvSpPr>
-          <p:cNvPr id="3" name="Content Placeholder 2"/>
+      <p:sp>
+        <p:nvSpPr>
+          <p:cNvPr id="4" name="Content Placeholder 3"/>
           <p:cNvSpPr>
             <a:spLocks noGrp="1"/>
           </p:cNvSpPr>
           <p:nvPr>
             <p:ph idx="1"/>
-            <p:custDataLst>
-              <p:tags r:id="rId3"/>
-            </p:custDataLst>
-          </p:nvPr>
-        </p:nvSpPr>
-        <p:spPr>
-          <a:xfrm>
-            <a:off x="457200" y="1828800"/>
-            <a:ext cx="5181600" cy="4297363"/>
-          </a:xfrm>
-        </p:spPr>
+          </p:nvPr>
+        </p:nvSpPr>
+        <p:spPr/>
         <p:txBody>
           <a:bodyPr/>
           <a:lstStyle/>
@@ -7523,9 +7414,54 @@
               </a:lnSpc>
             </a:pPr>
             <a:r>
+              <a:rPr lang="en-US" dirty="0"/>
+              <a:t>What progress has been made since the previous milestone?</a:t>
+            </a:r>
+          </a:p>
+          <a:p>
+            <a:pPr lvl="1">
+              <a:lnSpc>
+                <a:spcPct val="150000"/>
+              </a:lnSpc>
+            </a:pPr>
+            <a:r>
               <a:rPr lang="en-US" dirty="0" smtClean="0"/>
-              <a:t>Next Milestone: April 3rd</a:t>
-            </a:r>
+              <a:t>EHR Plugin Architecture Defined</a:t>
+            </a:r>
+          </a:p>
+          <a:p>
+            <a:pPr lvl="1">
+              <a:lnSpc>
+                <a:spcPct val="150000"/>
+              </a:lnSpc>
+            </a:pPr>
+            <a:r>
+              <a:rPr lang="en-US" dirty="0" smtClean="0"/>
+              <a:t>Database Design Detailed</a:t>
+            </a:r>
+          </a:p>
+          <a:p>
+            <a:pPr lvl="1">
+              <a:lnSpc>
+                <a:spcPct val="150000"/>
+              </a:lnSpc>
+            </a:pPr>
+            <a:r>
+              <a:rPr lang="en-US" dirty="0" smtClean="0"/>
+              <a:t>Research into Target Platforms and Data Sources (FHIR requests, etc.) – at approximately 55% complete</a:t>
+            </a:r>
+          </a:p>
+          <a:p>
+            <a:pPr lvl="1">
+              <a:lnSpc>
+                <a:spcPct val="150000"/>
+              </a:lnSpc>
+            </a:pPr>
+            <a:r>
+              <a:rPr lang="en-US" dirty="0" smtClean="0"/>
+              <a:t>Prototype EHR ~ 40% complete</a:t>
+            </a:r>
+            <a:endParaRPr lang="en-US" dirty="0"/>
           </a:p>
           <a:p>
             <a:pPr>
@@ -7535,47 +7471,26 @@
             </a:pPr>
             <a:r>
               <a:rPr lang="en-US" dirty="0"/>
-              <a:t>E</a:t>
-            </a:r>
-            <a:r>
-              <a:rPr lang="en-US" dirty="0" smtClean="0"/>
-              <a:t>xpected deliverables:</a:t>
-            </a:r>
-          </a:p>
-          <a:p>
-            <a:pPr lvl="1"/>
-            <a:r>
-              <a:rPr lang="en-US" dirty="0" smtClean="0"/>
-              <a:t>Completed EHR Prototype</a:t>
-            </a:r>
-          </a:p>
-          <a:p>
-            <a:pPr lvl="1"/>
-            <a:r>
-              <a:rPr lang="en-US" dirty="0" smtClean="0"/>
-              <a:t>Defined set of Project Risks </a:t>
-            </a:r>
-          </a:p>
-          <a:p>
-            <a:pPr lvl="1"/>
-            <a:r>
-              <a:rPr lang="en-US" dirty="0" smtClean="0"/>
-              <a:t>Target Platforms and Data Interop</a:t>
-            </a:r>
-          </a:p>
-          <a:p>
-            <a:pPr lvl="1"/>
-            <a:r>
-              <a:rPr lang="en-US" dirty="0" smtClean="0"/>
-              <a:t>Initial App Full Stack Development</a:t>
-            </a:r>
-          </a:p>
-          <a:p>
-            <a:pPr lvl="1"/>
-            <a:r>
-              <a:rPr lang="en-US" dirty="0" smtClean="0"/>
-              <a:t>Problem Item(s) List</a:t>
-            </a:r>
+              <a:t>Is the project currently ahead of schedule, on track, or delayed?</a:t>
+            </a:r>
+          </a:p>
+          <a:p>
+            <a:pPr lvl="1">
+              <a:lnSpc>
+                <a:spcPct val="150000"/>
+              </a:lnSpc>
+            </a:pPr>
+            <a:r>
+              <a:rPr lang="en-US" b="1" dirty="0" smtClean="0"/>
+              <a:t>ON TRACK</a:t>
+            </a:r>
+            <a:endParaRPr lang="en-US" b="1" dirty="0"/>
+          </a:p>
+          <a:p>
+            <a:pPr marL="0" indent="0">
+              <a:buNone/>
+            </a:pPr>
+            <a:endParaRPr lang="en-US" dirty="0"/>
           </a:p>
         </p:txBody>
       </p:sp>
@@ -7625,6 +7540,189 @@
           </p:cNvSpPr>
           <p:nvPr>
             <p:ph type="title"/>
+            <p:custDataLst>
+              <p:tags r:id="rId2"/>
+            </p:custDataLst>
+          </p:nvPr>
+        </p:nvSpPr>
+        <p:spPr>
+          <a:xfrm>
+            <a:off x="457200" y="914400"/>
+            <a:ext cx="5410200" cy="914400"/>
+          </a:xfrm>
+        </p:spPr>
+        <p:txBody>
+          <a:bodyPr/>
+          <a:lstStyle/>
+          <a:p>
+            <a:r>
+              <a:rPr lang="en-US" dirty="0" smtClean="0"/>
+              <a:t>Looking Ahead</a:t>
+            </a:r>
+            <a:endParaRPr lang="en-US" dirty="0"/>
+          </a:p>
+        </p:txBody>
+      </p:sp>
+      <p:pic>
+        <p:nvPicPr>
+          <p:cNvPr id="4" name="Picture 3"/>
+          <p:cNvPicPr>
+            <a:picLocks noChangeAspect="1"/>
+          </p:cNvPicPr>
+          <p:nvPr/>
+        </p:nvPicPr>
+        <p:blipFill rotWithShape="1">
+          <a:blip r:embed="rId5" cstate="email">
+            <a:extLst>
+              <a:ext uri="{28A0092B-C50C-407E-A947-70E740481C1C}">
+                <a14:useLocalDpi xmlns:a14="http://schemas.microsoft.com/office/drawing/2010/main"/>
+              </a:ext>
+            </a:extLst>
+          </a:blip>
+          <a:srcRect/>
+          <a:stretch/>
+        </p:blipFill>
+        <p:spPr>
+          <a:xfrm>
+            <a:off x="6065520" y="0"/>
+            <a:ext cx="3078480" cy="6858000"/>
+          </a:xfrm>
+          <a:prstGeom prst="rect">
+            <a:avLst/>
+          </a:prstGeom>
+        </p:spPr>
+      </p:pic>
+      <p:sp>
+        <p:nvSpPr>
+          <p:cNvPr id="3" name="Content Placeholder 2"/>
+          <p:cNvSpPr>
+            <a:spLocks noGrp="1"/>
+          </p:cNvSpPr>
+          <p:nvPr>
+            <p:ph idx="1"/>
+            <p:custDataLst>
+              <p:tags r:id="rId3"/>
+            </p:custDataLst>
+          </p:nvPr>
+        </p:nvSpPr>
+        <p:spPr>
+          <a:xfrm>
+            <a:off x="457200" y="1828800"/>
+            <a:ext cx="5181600" cy="4297363"/>
+          </a:xfrm>
+        </p:spPr>
+        <p:txBody>
+          <a:bodyPr/>
+          <a:lstStyle/>
+          <a:p>
+            <a:pPr>
+              <a:lnSpc>
+                <a:spcPct val="150000"/>
+              </a:lnSpc>
+            </a:pPr>
+            <a:r>
+              <a:rPr lang="en-US" dirty="0" smtClean="0"/>
+              <a:t>Next Milestone: April 3rd</a:t>
+            </a:r>
+          </a:p>
+          <a:p>
+            <a:pPr>
+              <a:lnSpc>
+                <a:spcPct val="150000"/>
+              </a:lnSpc>
+            </a:pPr>
+            <a:r>
+              <a:rPr lang="en-US" dirty="0"/>
+              <a:t>E</a:t>
+            </a:r>
+            <a:r>
+              <a:rPr lang="en-US" dirty="0" smtClean="0"/>
+              <a:t>xpected deliverables:</a:t>
+            </a:r>
+          </a:p>
+          <a:p>
+            <a:pPr lvl="1"/>
+            <a:r>
+              <a:rPr lang="en-US" dirty="0" smtClean="0"/>
+              <a:t>Completed EHR Prototype</a:t>
+            </a:r>
+          </a:p>
+          <a:p>
+            <a:pPr lvl="1"/>
+            <a:r>
+              <a:rPr lang="en-US" dirty="0" smtClean="0"/>
+              <a:t>Defined set of Project Risks </a:t>
+            </a:r>
+          </a:p>
+          <a:p>
+            <a:pPr lvl="1"/>
+            <a:r>
+              <a:rPr lang="en-US" dirty="0" smtClean="0"/>
+              <a:t>Target Platforms and Data Interop</a:t>
+            </a:r>
+          </a:p>
+          <a:p>
+            <a:pPr lvl="1"/>
+            <a:r>
+              <a:rPr lang="en-US" dirty="0" smtClean="0"/>
+              <a:t>Initial App Full Stack Development</a:t>
+            </a:r>
+          </a:p>
+          <a:p>
+            <a:pPr lvl="1"/>
+            <a:r>
+              <a:rPr lang="en-US" dirty="0" smtClean="0"/>
+              <a:t>Problem Item(s) List</a:t>
+            </a:r>
+          </a:p>
+        </p:txBody>
+      </p:sp>
+    </p:spTree>
+    <p:custDataLst>
+      <p:tags r:id="rId1"/>
+    </p:custDataLst>
+  </p:cSld>
+  <p:clrMapOvr>
+    <a:masterClrMapping/>
+  </p:clrMapOvr>
+  <p:transition spd="slow">
+    <p:fade/>
+  </p:transition>
+  <p:timing>
+    <p:tnLst>
+      <p:par>
+        <p:cTn id="1" dur="indefinite" restart="never" nodeType="tmRoot"/>
+      </p:par>
+    </p:tnLst>
+  </p:timing>
+</p:sld>
+</file>
+
+<file path=ppt/slides/slide9.xml><?xml version="1.0" encoding="utf-8"?>
+<p:sld xmlns:a="http://schemas.openxmlformats.org/drawingml/2006/main" xmlns:r="http://schemas.openxmlformats.org/officeDocument/2006/relationships" xmlns:p="http://schemas.openxmlformats.org/presentationml/2006/main">
+  <p:cSld>
+    <p:spTree>
+      <p:nvGrpSpPr>
+        <p:cNvPr id="1" name=""/>
+        <p:cNvGrpSpPr/>
+        <p:nvPr/>
+      </p:nvGrpSpPr>
+      <p:grpSpPr>
+        <a:xfrm>
+          <a:off x="0" y="0"/>
+          <a:ext cx="0" cy="0"/>
+          <a:chOff x="0" y="0"/>
+          <a:chExt cx="0" cy="0"/>
+        </a:xfrm>
+      </p:grpSpPr>
+      <p:sp>
+        <p:nvSpPr>
+          <p:cNvPr id="2" name="Title 1"/>
+          <p:cNvSpPr>
+            <a:spLocks noGrp="1"/>
+          </p:cNvSpPr>
+          <p:nvPr>
+            <p:ph type="title"/>
           </p:nvPr>
         </p:nvSpPr>
         <p:spPr>
@@ -7683,7 +7781,11 @@
             </a:r>
             <a:r>
               <a:rPr lang="en-US" dirty="0" smtClean="0"/>
-              <a:t>Manager/Developer</a:t>
+              <a:t>Manager/Developer </a:t>
+            </a:r>
+            <a:r>
+              <a:rPr lang="en-US" b="1" dirty="0" smtClean="0"/>
+              <a:t>Narrator 2</a:t>
             </a:r>
             <a:endParaRPr lang="en-US" dirty="0"/>
           </a:p>
@@ -7743,8 +7845,17 @@
             </a:r>
             <a:r>
               <a:rPr lang="en-US" dirty="0"/>
-              <a:t>: Developer/Tester</a:t>
-            </a:r>
+              <a:t>: </a:t>
+            </a:r>
+            <a:r>
+              <a:rPr lang="en-US" dirty="0" smtClean="0"/>
+              <a:t>Developer/Tester </a:t>
+            </a:r>
+            <a:r>
+              <a:rPr lang="en-US" b="1" dirty="0" smtClean="0"/>
+              <a:t>Narrator 1</a:t>
+            </a:r>
+            <a:endParaRPr lang="en-US" dirty="0"/>
           </a:p>
           <a:p>
             <a:endParaRPr lang="en-US" b="1" dirty="0"/>

</xml_diff>

<commit_message>
Update to Project Status Report 1
</commit_message>
<xml_diff>
--- a/Project Status Report 1.pptx
+++ b/Project Status Report 1.pptx
@@ -5,7 +5,7 @@
     <p:sldMasterId id="2147483648" r:id="rId2"/>
   </p:sldMasterIdLst>
   <p:notesMasterIdLst>
-    <p:notesMasterId r:id="rId12"/>
+    <p:notesMasterId r:id="rId13"/>
   </p:notesMasterIdLst>
   <p:sldIdLst>
     <p:sldId id="259" r:id="rId3"/>
@@ -13,10 +13,11 @@
     <p:sldId id="271" r:id="rId5"/>
     <p:sldId id="272" r:id="rId6"/>
     <p:sldId id="275" r:id="rId7"/>
-    <p:sldId id="269" r:id="rId8"/>
-    <p:sldId id="262" r:id="rId9"/>
-    <p:sldId id="267" r:id="rId10"/>
-    <p:sldId id="274" r:id="rId11"/>
+    <p:sldId id="276" r:id="rId8"/>
+    <p:sldId id="269" r:id="rId9"/>
+    <p:sldId id="262" r:id="rId10"/>
+    <p:sldId id="267" r:id="rId11"/>
+    <p:sldId id="274" r:id="rId12"/>
   </p:sldIdLst>
   <p:sldSz cx="9144000" cy="6858000" type="screen4x3"/>
   <p:notesSz cx="6858000" cy="9144000"/>
@@ -133,6 +134,7 @@
         <p14:section name="Status Update" id="{521DEF98-8796-4632-831A-16252E9A6054}">
           <p14:sldIdLst>
             <p14:sldId id="275"/>
+            <p14:sldId id="276"/>
             <p14:sldId id="269"/>
             <p14:sldId id="262"/>
           </p14:sldIdLst>
@@ -1002,7 +1004,7 @@
             <a:fld id="{5E0C3846-8D4C-4326-8BC7-9B455A036298}" type="slidenum">
               <a:rPr lang="en-US" smtClean="0"/>
               <a:pPr/>
-              <a:t>7</a:t>
+              <a:t>8</a:t>
             </a:fld>
             <a:endParaRPr lang="en-US"/>
           </a:p>
@@ -1115,7 +1117,7 @@
             <a:fld id="{5E0C3846-8D4C-4326-8BC7-9B455A036298}" type="slidenum">
               <a:rPr lang="en-US" smtClean="0"/>
               <a:pPr/>
-              <a:t>9</a:t>
+              <a:t>10</a:t>
             </a:fld>
             <a:endParaRPr lang="en-US"/>
           </a:p>
@@ -5227,6 +5229,193 @@
 </p:sld>
 </file>
 
+<file path=ppt/slides/slide10.xml><?xml version="1.0" encoding="utf-8"?>
+<p:sld xmlns:a="http://schemas.openxmlformats.org/drawingml/2006/main" xmlns:r="http://schemas.openxmlformats.org/officeDocument/2006/relationships" xmlns:p="http://schemas.openxmlformats.org/presentationml/2006/main">
+  <p:cSld>
+    <p:spTree>
+      <p:nvGrpSpPr>
+        <p:cNvPr id="1" name=""/>
+        <p:cNvGrpSpPr/>
+        <p:nvPr/>
+      </p:nvGrpSpPr>
+      <p:grpSpPr>
+        <a:xfrm>
+          <a:off x="0" y="0"/>
+          <a:ext cx="0" cy="0"/>
+          <a:chOff x="0" y="0"/>
+          <a:chExt cx="0" cy="0"/>
+        </a:xfrm>
+      </p:grpSpPr>
+      <p:sp>
+        <p:nvSpPr>
+          <p:cNvPr id="2" name="Title 1"/>
+          <p:cNvSpPr>
+            <a:spLocks noGrp="1"/>
+          </p:cNvSpPr>
+          <p:nvPr>
+            <p:ph type="title"/>
+          </p:nvPr>
+        </p:nvSpPr>
+        <p:spPr>
+          <a:xfrm>
+            <a:off x="3276600" y="1905000"/>
+            <a:ext cx="5597104" cy="1143001"/>
+          </a:xfrm>
+        </p:spPr>
+        <p:txBody>
+          <a:bodyPr>
+            <a:normAutofit fontScale="90000"/>
+          </a:bodyPr>
+          <a:lstStyle/>
+          <a:p>
+            <a:r>
+              <a:rPr lang="en-US" dirty="0" err="1" smtClean="0"/>
+              <a:t>Ehrgo</a:t>
+            </a:r>
+            <a:r>
+              <a:rPr lang="en-US" dirty="0" smtClean="0"/>
+              <a:t> Health Team Members</a:t>
+            </a:r>
+            <a:endParaRPr lang="en-US" dirty="0"/>
+          </a:p>
+        </p:txBody>
+      </p:sp>
+      <p:sp>
+        <p:nvSpPr>
+          <p:cNvPr id="3" name="Text Placeholder 2"/>
+          <p:cNvSpPr>
+            <a:spLocks noGrp="1"/>
+          </p:cNvSpPr>
+          <p:nvPr>
+            <p:ph type="body" idx="1"/>
+          </p:nvPr>
+        </p:nvSpPr>
+        <p:spPr>
+          <a:xfrm>
+            <a:off x="3352800" y="3048000"/>
+            <a:ext cx="5562600" cy="1500187"/>
+          </a:xfrm>
+        </p:spPr>
+        <p:txBody>
+          <a:bodyPr>
+            <a:normAutofit fontScale="85000" lnSpcReduction="10000"/>
+          </a:bodyPr>
+          <a:lstStyle/>
+          <a:p>
+            <a:r>
+              <a:rPr lang="en-US" b="1" dirty="0"/>
+              <a:t>Eric Greene</a:t>
+            </a:r>
+            <a:r>
+              <a:rPr lang="en-US" dirty="0"/>
+              <a:t>: Project </a:t>
+            </a:r>
+            <a:r>
+              <a:rPr lang="en-US" dirty="0" smtClean="0"/>
+              <a:t>Manager/Developer </a:t>
+            </a:r>
+            <a:r>
+              <a:rPr lang="en-US" b="1" dirty="0" smtClean="0"/>
+              <a:t>Narrator 2</a:t>
+            </a:r>
+            <a:endParaRPr lang="en-US" dirty="0"/>
+          </a:p>
+          <a:p>
+            <a:r>
+              <a:rPr lang="en-US" b="1" dirty="0" err="1"/>
+              <a:t>Huarui</a:t>
+            </a:r>
+            <a:r>
+              <a:rPr lang="en-US" b="1" dirty="0"/>
+              <a:t> Zheng</a:t>
+            </a:r>
+            <a:r>
+              <a:rPr lang="en-US" dirty="0"/>
+              <a:t>: </a:t>
+            </a:r>
+            <a:r>
+              <a:rPr lang="en-US" dirty="0" smtClean="0"/>
+              <a:t>Developer/Tester</a:t>
+            </a:r>
+            <a:endParaRPr lang="en-US" dirty="0"/>
+          </a:p>
+          <a:p>
+            <a:r>
+              <a:rPr lang="en-US" b="1" dirty="0"/>
+              <a:t>Donna Carey</a:t>
+            </a:r>
+            <a:r>
+              <a:rPr lang="en-US" dirty="0"/>
+              <a:t>: Documentation </a:t>
+            </a:r>
+            <a:r>
+              <a:rPr lang="en-US" dirty="0" smtClean="0"/>
+              <a:t>Lead/Developer</a:t>
+            </a:r>
+            <a:endParaRPr lang="en-US" dirty="0"/>
+          </a:p>
+          <a:p>
+            <a:r>
+              <a:rPr lang="en-US" b="1" dirty="0"/>
+              <a:t>Tommy Parnell</a:t>
+            </a:r>
+            <a:r>
+              <a:rPr lang="en-US" dirty="0"/>
+              <a:t>: Development </a:t>
+            </a:r>
+            <a:r>
+              <a:rPr lang="en-US" dirty="0" smtClean="0"/>
+              <a:t>Lead/Documentation</a:t>
+            </a:r>
+            <a:endParaRPr lang="en-US" dirty="0"/>
+          </a:p>
+          <a:p>
+            <a:r>
+              <a:rPr lang="en-US" b="1" dirty="0"/>
+              <a:t>James Ruiz</a:t>
+            </a:r>
+            <a:r>
+              <a:rPr lang="en-US" dirty="0"/>
+              <a:t>: </a:t>
+            </a:r>
+            <a:r>
+              <a:rPr lang="en-US" dirty="0" smtClean="0"/>
+              <a:t>Developer/Tester </a:t>
+            </a:r>
+            <a:r>
+              <a:rPr lang="en-US" b="1" dirty="0" smtClean="0"/>
+              <a:t>Narrator 1</a:t>
+            </a:r>
+            <a:endParaRPr lang="en-US" dirty="0"/>
+          </a:p>
+          <a:p>
+            <a:endParaRPr lang="en-US" b="1" dirty="0"/>
+          </a:p>
+        </p:txBody>
+      </p:sp>
+    </p:spTree>
+    <p:extLst>
+      <p:ext uri="{BB962C8B-B14F-4D97-AF65-F5344CB8AC3E}">
+        <p14:creationId xmlns:p14="http://schemas.microsoft.com/office/powerpoint/2010/main" val="3761678171"/>
+      </p:ext>
+    </p:extLst>
+  </p:cSld>
+  <p:clrMapOvr>
+    <a:masterClrMapping/>
+  </p:clrMapOvr>
+  <p:transition spd="slow">
+    <p:fade/>
+  </p:transition>
+  <p:timing>
+    <p:tnLst>
+      <p:par>
+        <p:cTn id="1" dur="indefinite" restart="never" nodeType="tmRoot"/>
+      </p:par>
+    </p:tnLst>
+  </p:timing>
+</p:sld>
+</file>
+
 <file path=ppt/slides/slide2.xml><?xml version="1.0" encoding="utf-8"?>
 <p:sld xmlns:a="http://schemas.openxmlformats.org/drawingml/2006/main" xmlns:r="http://schemas.openxmlformats.org/officeDocument/2006/relationships" xmlns:p="http://schemas.openxmlformats.org/presentationml/2006/main">
   <p:cSld>
@@ -7198,11 +7387,7 @@
           <a:p>
             <a:r>
               <a:rPr lang="en-US" dirty="0" smtClean="0"/>
-              <a:t>Technology </a:t>
-            </a:r>
-            <a:r>
-              <a:rPr lang="en-US" dirty="0" smtClean="0"/>
-              <a:t>Requirements</a:t>
+              <a:t>Technology Requirements</a:t>
             </a:r>
             <a:endParaRPr lang="en-US" dirty="0"/>
           </a:p>
@@ -7265,6 +7450,292 @@
 </file>
 
 <file path=ppt/slides/slide6.xml><?xml version="1.0" encoding="utf-8"?>
+<p:sld xmlns:a="http://schemas.openxmlformats.org/drawingml/2006/main" xmlns:r="http://schemas.openxmlformats.org/officeDocument/2006/relationships" xmlns:p="http://schemas.openxmlformats.org/presentationml/2006/main">
+  <p:cSld>
+    <p:spTree>
+      <p:nvGrpSpPr>
+        <p:cNvPr id="1" name=""/>
+        <p:cNvGrpSpPr/>
+        <p:nvPr/>
+      </p:nvGrpSpPr>
+      <p:grpSpPr>
+        <a:xfrm>
+          <a:off x="0" y="0"/>
+          <a:ext cx="0" cy="0"/>
+          <a:chOff x="0" y="0"/>
+          <a:chExt cx="0" cy="0"/>
+        </a:xfrm>
+      </p:grpSpPr>
+      <p:sp>
+        <p:nvSpPr>
+          <p:cNvPr id="2" name="Title 1"/>
+          <p:cNvSpPr>
+            <a:spLocks noGrp="1"/>
+          </p:cNvSpPr>
+          <p:nvPr>
+            <p:ph type="title"/>
+          </p:nvPr>
+        </p:nvSpPr>
+        <p:spPr/>
+        <p:txBody>
+          <a:bodyPr/>
+          <a:lstStyle/>
+          <a:p>
+            <a:r>
+              <a:rPr lang="en-US" dirty="0" smtClean="0"/>
+              <a:t>EHR Plugin Data Analysis</a:t>
+            </a:r>
+            <a:endParaRPr lang="en-US" dirty="0"/>
+          </a:p>
+        </p:txBody>
+      </p:sp>
+      <p:sp>
+        <p:nvSpPr>
+          <p:cNvPr id="3" name="Content Placeholder 2"/>
+          <p:cNvSpPr>
+            <a:spLocks noGrp="1"/>
+          </p:cNvSpPr>
+          <p:nvPr>
+            <p:ph idx="1"/>
+          </p:nvPr>
+        </p:nvSpPr>
+        <p:spPr>
+          <a:xfrm>
+            <a:off x="457200" y="1676400"/>
+            <a:ext cx="8229600" cy="5029200"/>
+          </a:xfrm>
+        </p:spPr>
+        <p:txBody>
+          <a:bodyPr>
+            <a:normAutofit/>
+          </a:bodyPr>
+          <a:lstStyle/>
+          <a:p>
+            <a:pPr marL="0" indent="0">
+              <a:buNone/>
+            </a:pPr>
+            <a:r>
+              <a:rPr lang="en-US" sz="1600" dirty="0" smtClean="0"/>
+              <a:t>Through observation and patient history a provider can analyze if there is a relationship </a:t>
+            </a:r>
+            <a:r>
+              <a:rPr lang="en-US" sz="1600" dirty="0" smtClean="0"/>
+              <a:t>between </a:t>
+            </a:r>
+            <a:r>
+              <a:rPr lang="en-US" sz="1600" dirty="0" smtClean="0"/>
+              <a:t>a substance and subsequent reaction that would lead to a diagnosis of an allergy.</a:t>
+            </a:r>
+          </a:p>
+          <a:p>
+            <a:endParaRPr lang="en-US" sz="1600" dirty="0" smtClean="0"/>
+          </a:p>
+          <a:p>
+            <a:pPr marL="0" indent="0">
+              <a:buNone/>
+            </a:pPr>
+            <a:endParaRPr lang="en-US" sz="1600" dirty="0" smtClean="0"/>
+          </a:p>
+          <a:p>
+            <a:pPr marL="0" indent="0">
+              <a:buNone/>
+            </a:pPr>
+            <a:endParaRPr lang="en-US" sz="1600" dirty="0"/>
+          </a:p>
+          <a:p>
+            <a:pPr marL="0" indent="0">
+              <a:buNone/>
+            </a:pPr>
+            <a:endParaRPr lang="en-US" sz="1600" dirty="0" smtClean="0"/>
+          </a:p>
+          <a:p>
+            <a:pPr marL="0" indent="0">
+              <a:buNone/>
+            </a:pPr>
+            <a:endParaRPr lang="en-US" sz="1600" dirty="0"/>
+          </a:p>
+          <a:p>
+            <a:pPr marL="0" indent="0">
+              <a:buNone/>
+            </a:pPr>
+            <a:endParaRPr lang="en-US" sz="1600" dirty="0" smtClean="0"/>
+          </a:p>
+          <a:p>
+            <a:pPr marL="0" indent="0">
+              <a:buNone/>
+            </a:pPr>
+            <a:endParaRPr lang="en-US" sz="1600" dirty="0"/>
+          </a:p>
+          <a:p>
+            <a:pPr marL="0" indent="0">
+              <a:buNone/>
+            </a:pPr>
+            <a:endParaRPr lang="en-US" sz="1600" dirty="0" smtClean="0"/>
+          </a:p>
+          <a:p>
+            <a:pPr marL="0" indent="0">
+              <a:buNone/>
+            </a:pPr>
+            <a:endParaRPr lang="en-US" sz="1600" dirty="0"/>
+          </a:p>
+          <a:p>
+            <a:pPr marL="0" indent="0">
+              <a:buNone/>
+            </a:pPr>
+            <a:endParaRPr lang="en-US" sz="1600" dirty="0"/>
+          </a:p>
+        </p:txBody>
+      </p:sp>
+      <p:pic>
+        <p:nvPicPr>
+          <p:cNvPr id="4" name="Picture 3"/>
+          <p:cNvPicPr>
+            <a:picLocks noChangeAspect="1"/>
+          </p:cNvPicPr>
+          <p:nvPr/>
+        </p:nvPicPr>
+        <p:blipFill>
+          <a:blip r:embed="rId2"/>
+          <a:stretch>
+            <a:fillRect/>
+          </a:stretch>
+        </p:blipFill>
+        <p:spPr>
+          <a:xfrm>
+            <a:off x="5197938" y="2667000"/>
+            <a:ext cx="2726862" cy="1981200"/>
+          </a:xfrm>
+          <a:prstGeom prst="rect">
+            <a:avLst/>
+          </a:prstGeom>
+        </p:spPr>
+      </p:pic>
+      <p:sp>
+        <p:nvSpPr>
+          <p:cNvPr id="5" name="TextBox 4"/>
+          <p:cNvSpPr txBox="1"/>
+          <p:nvPr/>
+        </p:nvSpPr>
+        <p:spPr>
+          <a:xfrm>
+            <a:off x="457200" y="2971800"/>
+            <a:ext cx="4648200" cy="2862322"/>
+          </a:xfrm>
+          <a:prstGeom prst="rect">
+            <a:avLst/>
+          </a:prstGeom>
+          <a:noFill/>
+        </p:spPr>
+        <p:txBody>
+          <a:bodyPr wrap="square" rtlCol="0">
+            <a:spAutoFit/>
+          </a:bodyPr>
+          <a:lstStyle/>
+          <a:p>
+            <a:pPr marL="285750" indent="-285750">
+              <a:buFont typeface="Arial" panose="020B0604020202020204" pitchFamily="34" charset="0"/>
+              <a:buChar char="•"/>
+            </a:pPr>
+            <a:r>
+              <a:rPr lang="en-US" dirty="0"/>
+              <a:t>Using available FHIR </a:t>
+            </a:r>
+            <a:r>
+              <a:rPr lang="en-US" dirty="0" smtClean="0"/>
+              <a:t>resources this </a:t>
+            </a:r>
+            <a:r>
+              <a:rPr lang="en-US" dirty="0"/>
+              <a:t>information can be pulled into </a:t>
+            </a:r>
+            <a:r>
+              <a:rPr lang="en-US"/>
+              <a:t>the </a:t>
+            </a:r>
+            <a:r>
+              <a:rPr lang="en-US" smtClean="0"/>
+              <a:t>EH</a:t>
+            </a:r>
+            <a:r>
+              <a:rPr lang="en-US" smtClean="0"/>
+              <a:t>R.</a:t>
+            </a:r>
+            <a:r>
+              <a:rPr lang="en-US" dirty="0" smtClean="0"/>
+              <a:t/>
+            </a:r>
+            <a:br>
+              <a:rPr lang="en-US" dirty="0" smtClean="0"/>
+            </a:br>
+            <a:endParaRPr lang="en-US" dirty="0" smtClean="0"/>
+          </a:p>
+          <a:p>
+            <a:pPr marL="285750" indent="-285750">
+              <a:buFont typeface="Arial" panose="020B0604020202020204" pitchFamily="34" charset="0"/>
+              <a:buChar char="•"/>
+            </a:pPr>
+            <a:r>
+              <a:rPr lang="en-US" dirty="0" smtClean="0"/>
+              <a:t>The plugin architecture would provide alerts to the provider regarding potential issues and dangers regarding current course of treatment.</a:t>
+            </a:r>
+            <a:br>
+              <a:rPr lang="en-US" dirty="0" smtClean="0"/>
+            </a:br>
+            <a:endParaRPr lang="en-US" dirty="0" smtClean="0"/>
+          </a:p>
+          <a:p>
+            <a:pPr marL="285750" indent="-285750">
+              <a:buFont typeface="Arial" panose="020B0604020202020204" pitchFamily="34" charset="0"/>
+              <a:buChar char="•"/>
+            </a:pPr>
+            <a:r>
+              <a:rPr lang="en-US" dirty="0" smtClean="0"/>
+              <a:t>A treatment plan can be created to avoid potentially life-threatening conflicts.</a:t>
+            </a:r>
+          </a:p>
+        </p:txBody>
+      </p:sp>
+      <p:pic>
+        <p:nvPicPr>
+          <p:cNvPr id="6" name="Picture 5"/>
+          <p:cNvPicPr>
+            <a:picLocks noChangeAspect="1"/>
+          </p:cNvPicPr>
+          <p:nvPr/>
+        </p:nvPicPr>
+        <p:blipFill>
+          <a:blip r:embed="rId3"/>
+          <a:stretch>
+            <a:fillRect/>
+          </a:stretch>
+        </p:blipFill>
+        <p:spPr>
+          <a:xfrm>
+            <a:off x="5223416" y="4648200"/>
+            <a:ext cx="2777584" cy="1868868"/>
+          </a:xfrm>
+          <a:prstGeom prst="rect">
+            <a:avLst/>
+          </a:prstGeom>
+        </p:spPr>
+      </p:pic>
+    </p:spTree>
+    <p:extLst>
+      <p:ext uri="{BB962C8B-B14F-4D97-AF65-F5344CB8AC3E}">
+        <p14:creationId xmlns:p14="http://schemas.microsoft.com/office/powerpoint/2010/main" val="799359540"/>
+      </p:ext>
+    </p:extLst>
+  </p:cSld>
+  <p:clrMapOvr>
+    <a:masterClrMapping/>
+  </p:clrMapOvr>
+  <p:transition spd="slow">
+    <p:fade/>
+  </p:transition>
+</p:sld>
+</file>
+
+<file path=ppt/slides/slide7.xml><?xml version="1.0" encoding="utf-8"?>
 <p:sld xmlns:a="http://schemas.openxmlformats.org/drawingml/2006/main" xmlns:r="http://schemas.openxmlformats.org/officeDocument/2006/relationships" xmlns:p="http://schemas.openxmlformats.org/presentationml/2006/main">
   <p:cSld>
     <p:spTree>
@@ -7350,171 +7821,6 @@
 </p:sld>
 </file>
 
-<file path=ppt/slides/slide7.xml><?xml version="1.0" encoding="utf-8"?>
-<p:sld xmlns:a="http://schemas.openxmlformats.org/drawingml/2006/main" xmlns:r="http://schemas.openxmlformats.org/officeDocument/2006/relationships" xmlns:p="http://schemas.openxmlformats.org/presentationml/2006/main">
-  <p:cSld>
-    <p:spTree>
-      <p:nvGrpSpPr>
-        <p:cNvPr id="1" name=""/>
-        <p:cNvGrpSpPr/>
-        <p:nvPr/>
-      </p:nvGrpSpPr>
-      <p:grpSpPr>
-        <a:xfrm>
-          <a:off x="0" y="0"/>
-          <a:ext cx="0" cy="0"/>
-          <a:chOff x="0" y="0"/>
-          <a:chExt cx="0" cy="0"/>
-        </a:xfrm>
-      </p:grpSpPr>
-      <p:sp>
-        <p:nvSpPr>
-          <p:cNvPr id="2" name="Title 1"/>
-          <p:cNvSpPr>
-            <a:spLocks noGrp="1"/>
-          </p:cNvSpPr>
-          <p:nvPr>
-            <p:ph type="title"/>
-            <p:custDataLst>
-              <p:tags r:id="rId2"/>
-            </p:custDataLst>
-          </p:nvPr>
-        </p:nvSpPr>
-        <p:spPr/>
-        <p:txBody>
-          <a:bodyPr/>
-          <a:lstStyle/>
-          <a:p>
-            <a:r>
-              <a:rPr lang="en-US" dirty="0" smtClean="0"/>
-              <a:t>Current Status</a:t>
-            </a:r>
-            <a:endParaRPr lang="en-US" dirty="0"/>
-          </a:p>
-        </p:txBody>
-      </p:sp>
-      <p:sp>
-        <p:nvSpPr>
-          <p:cNvPr id="4" name="Content Placeholder 3"/>
-          <p:cNvSpPr>
-            <a:spLocks noGrp="1"/>
-          </p:cNvSpPr>
-          <p:nvPr>
-            <p:ph idx="1"/>
-          </p:nvPr>
-        </p:nvSpPr>
-        <p:spPr/>
-        <p:txBody>
-          <a:bodyPr/>
-          <a:lstStyle/>
-          <a:p>
-            <a:pPr>
-              <a:lnSpc>
-                <a:spcPct val="150000"/>
-              </a:lnSpc>
-            </a:pPr>
-            <a:r>
-              <a:rPr lang="en-US" dirty="0"/>
-              <a:t>What progress has been made since the previous milestone?</a:t>
-            </a:r>
-          </a:p>
-          <a:p>
-            <a:pPr lvl="1">
-              <a:lnSpc>
-                <a:spcPct val="150000"/>
-              </a:lnSpc>
-            </a:pPr>
-            <a:r>
-              <a:rPr lang="en-US" dirty="0" smtClean="0"/>
-              <a:t>EHR Plugin Architecture Defined</a:t>
-            </a:r>
-          </a:p>
-          <a:p>
-            <a:pPr lvl="1">
-              <a:lnSpc>
-                <a:spcPct val="150000"/>
-              </a:lnSpc>
-            </a:pPr>
-            <a:r>
-              <a:rPr lang="en-US" dirty="0" smtClean="0"/>
-              <a:t>Database Design Detailed</a:t>
-            </a:r>
-          </a:p>
-          <a:p>
-            <a:pPr lvl="1">
-              <a:lnSpc>
-                <a:spcPct val="150000"/>
-              </a:lnSpc>
-            </a:pPr>
-            <a:r>
-              <a:rPr lang="en-US" dirty="0" smtClean="0"/>
-              <a:t>Research into Target Platforms and Data Sources (FHIR requests, etc.) – at approximately 55% complete</a:t>
-            </a:r>
-          </a:p>
-          <a:p>
-            <a:pPr lvl="1">
-              <a:lnSpc>
-                <a:spcPct val="150000"/>
-              </a:lnSpc>
-            </a:pPr>
-            <a:r>
-              <a:rPr lang="en-US" dirty="0" smtClean="0"/>
-              <a:t>Prototype EHR ~ 40% complete</a:t>
-            </a:r>
-            <a:endParaRPr lang="en-US" dirty="0"/>
-          </a:p>
-          <a:p>
-            <a:pPr>
-              <a:lnSpc>
-                <a:spcPct val="150000"/>
-              </a:lnSpc>
-            </a:pPr>
-            <a:r>
-              <a:rPr lang="en-US" dirty="0"/>
-              <a:t>Is the project currently ahead of schedule, on track, or delayed?</a:t>
-            </a:r>
-          </a:p>
-          <a:p>
-            <a:pPr lvl="1">
-              <a:lnSpc>
-                <a:spcPct val="150000"/>
-              </a:lnSpc>
-            </a:pPr>
-            <a:r>
-              <a:rPr lang="en-US" b="1" dirty="0" smtClean="0"/>
-              <a:t>ON TRACK</a:t>
-            </a:r>
-            <a:endParaRPr lang="en-US" b="1" dirty="0"/>
-          </a:p>
-          <a:p>
-            <a:pPr marL="0" indent="0">
-              <a:buNone/>
-            </a:pPr>
-            <a:endParaRPr lang="en-US" dirty="0"/>
-          </a:p>
-        </p:txBody>
-      </p:sp>
-    </p:spTree>
-    <p:custDataLst>
-      <p:tags r:id="rId1"/>
-    </p:custDataLst>
-  </p:cSld>
-  <p:clrMapOvr>
-    <a:masterClrMapping/>
-  </p:clrMapOvr>
-  <p:transition spd="slow">
-    <p:fade/>
-  </p:transition>
-  <p:timing>
-    <p:tnLst>
-      <p:par>
-        <p:cTn id="1" dur="indefinite" restart="never" nodeType="tmRoot"/>
-      </p:par>
-    </p:tnLst>
-  </p:timing>
-</p:sld>
-</file>
-
 <file path=ppt/slides/slide8.xml><?xml version="1.0" encoding="utf-8"?>
 <p:sld xmlns:a="http://schemas.openxmlformats.org/drawingml/2006/main" xmlns:r="http://schemas.openxmlformats.org/officeDocument/2006/relationships" xmlns:p="http://schemas.openxmlformats.org/presentationml/2006/main">
   <p:cSld>
@@ -7545,72 +7851,30 @@
             </p:custDataLst>
           </p:nvPr>
         </p:nvSpPr>
-        <p:spPr>
-          <a:xfrm>
-            <a:off x="457200" y="914400"/>
-            <a:ext cx="5410200" cy="914400"/>
-          </a:xfrm>
-        </p:spPr>
+        <p:spPr/>
         <p:txBody>
           <a:bodyPr/>
           <a:lstStyle/>
           <a:p>
             <a:r>
               <a:rPr lang="en-US" dirty="0" smtClean="0"/>
-              <a:t>Looking Ahead</a:t>
+              <a:t>Current Status</a:t>
             </a:r>
             <a:endParaRPr lang="en-US" dirty="0"/>
           </a:p>
         </p:txBody>
       </p:sp>
-      <p:pic>
-        <p:nvPicPr>
-          <p:cNvPr id="4" name="Picture 3"/>
-          <p:cNvPicPr>
-            <a:picLocks noChangeAspect="1"/>
-          </p:cNvPicPr>
-          <p:nvPr/>
-        </p:nvPicPr>
-        <p:blipFill rotWithShape="1">
-          <a:blip r:embed="rId5" cstate="email">
-            <a:extLst>
-              <a:ext uri="{28A0092B-C50C-407E-A947-70E740481C1C}">
-                <a14:useLocalDpi xmlns:a14="http://schemas.microsoft.com/office/drawing/2010/main"/>
-              </a:ext>
-            </a:extLst>
-          </a:blip>
-          <a:srcRect/>
-          <a:stretch/>
-        </p:blipFill>
-        <p:spPr>
-          <a:xfrm>
-            <a:off x="6065520" y="0"/>
-            <a:ext cx="3078480" cy="6858000"/>
-          </a:xfrm>
-          <a:prstGeom prst="rect">
-            <a:avLst/>
-          </a:prstGeom>
-        </p:spPr>
-      </p:pic>
-      <p:sp>
-        <p:nvSpPr>
-          <p:cNvPr id="3" name="Content Placeholder 2"/>
+      <p:sp>
+        <p:nvSpPr>
+          <p:cNvPr id="4" name="Content Placeholder 3"/>
           <p:cNvSpPr>
             <a:spLocks noGrp="1"/>
           </p:cNvSpPr>
           <p:nvPr>
             <p:ph idx="1"/>
-            <p:custDataLst>
-              <p:tags r:id="rId3"/>
-            </p:custDataLst>
-          </p:nvPr>
-        </p:nvSpPr>
-        <p:spPr>
-          <a:xfrm>
-            <a:off x="457200" y="1828800"/>
-            <a:ext cx="5181600" cy="4297363"/>
-          </a:xfrm>
-        </p:spPr>
+          </p:nvPr>
+        </p:nvSpPr>
+        <p:spPr/>
         <p:txBody>
           <a:bodyPr/>
           <a:lstStyle/>
@@ -7621,9 +7885,54 @@
               </a:lnSpc>
             </a:pPr>
             <a:r>
+              <a:rPr lang="en-US" dirty="0"/>
+              <a:t>What progress has been made since the previous milestone?</a:t>
+            </a:r>
+          </a:p>
+          <a:p>
+            <a:pPr lvl="1">
+              <a:lnSpc>
+                <a:spcPct val="150000"/>
+              </a:lnSpc>
+            </a:pPr>
+            <a:r>
               <a:rPr lang="en-US" dirty="0" smtClean="0"/>
-              <a:t>Next Milestone: April 3rd</a:t>
-            </a:r>
+              <a:t>EHR Plugin Architecture Defined</a:t>
+            </a:r>
+          </a:p>
+          <a:p>
+            <a:pPr lvl="1">
+              <a:lnSpc>
+                <a:spcPct val="150000"/>
+              </a:lnSpc>
+            </a:pPr>
+            <a:r>
+              <a:rPr lang="en-US" dirty="0" smtClean="0"/>
+              <a:t>Database Design Detailed</a:t>
+            </a:r>
+          </a:p>
+          <a:p>
+            <a:pPr lvl="1">
+              <a:lnSpc>
+                <a:spcPct val="150000"/>
+              </a:lnSpc>
+            </a:pPr>
+            <a:r>
+              <a:rPr lang="en-US" dirty="0" smtClean="0"/>
+              <a:t>Research into Target Platforms and Data Sources (FHIR requests, etc.) – at approximately 55% complete</a:t>
+            </a:r>
+          </a:p>
+          <a:p>
+            <a:pPr lvl="1">
+              <a:lnSpc>
+                <a:spcPct val="150000"/>
+              </a:lnSpc>
+            </a:pPr>
+            <a:r>
+              <a:rPr lang="en-US" dirty="0" smtClean="0"/>
+              <a:t>Prototype EHR ~ 40% complete</a:t>
+            </a:r>
+            <a:endParaRPr lang="en-US" dirty="0"/>
           </a:p>
           <a:p>
             <a:pPr>
@@ -7633,47 +7942,26 @@
             </a:pPr>
             <a:r>
               <a:rPr lang="en-US" dirty="0"/>
-              <a:t>E</a:t>
-            </a:r>
-            <a:r>
-              <a:rPr lang="en-US" dirty="0" smtClean="0"/>
-              <a:t>xpected deliverables:</a:t>
-            </a:r>
-          </a:p>
-          <a:p>
-            <a:pPr lvl="1"/>
-            <a:r>
-              <a:rPr lang="en-US" dirty="0" smtClean="0"/>
-              <a:t>Completed EHR Prototype</a:t>
-            </a:r>
-          </a:p>
-          <a:p>
-            <a:pPr lvl="1"/>
-            <a:r>
-              <a:rPr lang="en-US" dirty="0" smtClean="0"/>
-              <a:t>Defined set of Project Risks </a:t>
-            </a:r>
-          </a:p>
-          <a:p>
-            <a:pPr lvl="1"/>
-            <a:r>
-              <a:rPr lang="en-US" dirty="0" smtClean="0"/>
-              <a:t>Target Platforms and Data Interop</a:t>
-            </a:r>
-          </a:p>
-          <a:p>
-            <a:pPr lvl="1"/>
-            <a:r>
-              <a:rPr lang="en-US" dirty="0" smtClean="0"/>
-              <a:t>Initial App Full Stack Development</a:t>
-            </a:r>
-          </a:p>
-          <a:p>
-            <a:pPr lvl="1"/>
-            <a:r>
-              <a:rPr lang="en-US" dirty="0" smtClean="0"/>
-              <a:t>Problem Item(s) List</a:t>
-            </a:r>
+              <a:t>Is the project currently ahead of schedule, on track, or delayed?</a:t>
+            </a:r>
+          </a:p>
+          <a:p>
+            <a:pPr lvl="1">
+              <a:lnSpc>
+                <a:spcPct val="150000"/>
+              </a:lnSpc>
+            </a:pPr>
+            <a:r>
+              <a:rPr lang="en-US" b="1" dirty="0" smtClean="0"/>
+              <a:t>ON TRACK</a:t>
+            </a:r>
+            <a:endParaRPr lang="en-US" b="1" dirty="0"/>
+          </a:p>
+          <a:p>
+            <a:pPr marL="0" indent="0">
+              <a:buNone/>
+            </a:pPr>
+            <a:endParaRPr lang="en-US" dirty="0"/>
           </a:p>
         </p:txBody>
       </p:sp>
@@ -7723,151 +8011,147 @@
           </p:cNvSpPr>
           <p:nvPr>
             <p:ph type="title"/>
+            <p:custDataLst>
+              <p:tags r:id="rId2"/>
+            </p:custDataLst>
           </p:nvPr>
         </p:nvSpPr>
         <p:spPr>
           <a:xfrm>
-            <a:off x="3276600" y="1905000"/>
-            <a:ext cx="5597104" cy="1143001"/>
+            <a:off x="457200" y="914400"/>
+            <a:ext cx="5410200" cy="914400"/>
           </a:xfrm>
         </p:spPr>
         <p:txBody>
-          <a:bodyPr>
-            <a:normAutofit fontScale="90000"/>
-          </a:bodyPr>
-          <a:lstStyle/>
-          <a:p>
-            <a:r>
-              <a:rPr lang="en-US" dirty="0" err="1" smtClean="0"/>
-              <a:t>Ehrgo</a:t>
-            </a:r>
+          <a:bodyPr/>
+          <a:lstStyle/>
+          <a:p>
             <a:r>
               <a:rPr lang="en-US" dirty="0" smtClean="0"/>
-              <a:t> Health Team Members</a:t>
+              <a:t>Looking Ahead</a:t>
             </a:r>
             <a:endParaRPr lang="en-US" dirty="0"/>
           </a:p>
         </p:txBody>
       </p:sp>
-      <p:sp>
-        <p:nvSpPr>
-          <p:cNvPr id="3" name="Text Placeholder 2"/>
-          <p:cNvSpPr>
-            <a:spLocks noGrp="1"/>
-          </p:cNvSpPr>
-          <p:nvPr>
-            <p:ph type="body" idx="1"/>
-          </p:nvPr>
-        </p:nvSpPr>
+      <p:pic>
+        <p:nvPicPr>
+          <p:cNvPr id="4" name="Picture 3"/>
+          <p:cNvPicPr>
+            <a:picLocks noChangeAspect="1"/>
+          </p:cNvPicPr>
+          <p:nvPr/>
+        </p:nvPicPr>
+        <p:blipFill rotWithShape="1">
+          <a:blip r:embed="rId5" cstate="email">
+            <a:extLst>
+              <a:ext uri="{28A0092B-C50C-407E-A947-70E740481C1C}">
+                <a14:useLocalDpi xmlns:a14="http://schemas.microsoft.com/office/drawing/2010/main"/>
+              </a:ext>
+            </a:extLst>
+          </a:blip>
+          <a:srcRect/>
+          <a:stretch/>
+        </p:blipFill>
         <p:spPr>
           <a:xfrm>
-            <a:off x="3352800" y="3048000"/>
-            <a:ext cx="5562600" cy="1500187"/>
+            <a:off x="6065520" y="0"/>
+            <a:ext cx="3078480" cy="6858000"/>
+          </a:xfrm>
+          <a:prstGeom prst="rect">
+            <a:avLst/>
+          </a:prstGeom>
+        </p:spPr>
+      </p:pic>
+      <p:sp>
+        <p:nvSpPr>
+          <p:cNvPr id="3" name="Content Placeholder 2"/>
+          <p:cNvSpPr>
+            <a:spLocks noGrp="1"/>
+          </p:cNvSpPr>
+          <p:nvPr>
+            <p:ph idx="1"/>
+            <p:custDataLst>
+              <p:tags r:id="rId3"/>
+            </p:custDataLst>
+          </p:nvPr>
+        </p:nvSpPr>
+        <p:spPr>
+          <a:xfrm>
+            <a:off x="457200" y="1828800"/>
+            <a:ext cx="5181600" cy="4297363"/>
           </a:xfrm>
         </p:spPr>
         <p:txBody>
-          <a:bodyPr>
-            <a:normAutofit fontScale="85000" lnSpcReduction="10000"/>
-          </a:bodyPr>
-          <a:lstStyle/>
-          <a:p>
-            <a:r>
-              <a:rPr lang="en-US" b="1" dirty="0"/>
-              <a:t>Eric Greene</a:t>
-            </a:r>
+          <a:bodyPr/>
+          <a:lstStyle/>
+          <a:p>
+            <a:pPr>
+              <a:lnSpc>
+                <a:spcPct val="150000"/>
+              </a:lnSpc>
+            </a:pPr>
+            <a:r>
+              <a:rPr lang="en-US" dirty="0" smtClean="0"/>
+              <a:t>Next Milestone: April 3rd</a:t>
+            </a:r>
+          </a:p>
+          <a:p>
+            <a:pPr>
+              <a:lnSpc>
+                <a:spcPct val="150000"/>
+              </a:lnSpc>
+            </a:pPr>
             <a:r>
               <a:rPr lang="en-US" dirty="0"/>
-              <a:t>: Project </a:t>
+              <a:t>E</a:t>
             </a:r>
             <a:r>
               <a:rPr lang="en-US" dirty="0" smtClean="0"/>
-              <a:t>Manager/Developer </a:t>
-            </a:r>
-            <a:r>
-              <a:rPr lang="en-US" b="1" dirty="0" smtClean="0"/>
-              <a:t>Narrator 2</a:t>
-            </a:r>
-            <a:endParaRPr lang="en-US" dirty="0"/>
-          </a:p>
-          <a:p>
-            <a:r>
-              <a:rPr lang="en-US" b="1" dirty="0" err="1"/>
-              <a:t>Huarui</a:t>
-            </a:r>
-            <a:r>
-              <a:rPr lang="en-US" b="1" dirty="0"/>
-              <a:t> Zheng</a:t>
-            </a:r>
-            <a:r>
-              <a:rPr lang="en-US" dirty="0"/>
-              <a:t>: </a:t>
-            </a:r>
+              <a:t>xpected deliverables:</a:t>
+            </a:r>
+          </a:p>
+          <a:p>
+            <a:pPr lvl="1"/>
             <a:r>
               <a:rPr lang="en-US" dirty="0" smtClean="0"/>
-              <a:t>Developer/Tester</a:t>
-            </a:r>
-            <a:endParaRPr lang="en-US" dirty="0"/>
-          </a:p>
-          <a:p>
-            <a:r>
-              <a:rPr lang="en-US" b="1" dirty="0"/>
-              <a:t>Donna Carey</a:t>
-            </a:r>
-            <a:r>
-              <a:rPr lang="en-US" dirty="0"/>
-              <a:t>: Documentation </a:t>
-            </a:r>
+              <a:t>Completed EHR Prototype</a:t>
+            </a:r>
+          </a:p>
+          <a:p>
+            <a:pPr lvl="1"/>
             <a:r>
               <a:rPr lang="en-US" dirty="0" smtClean="0"/>
-              <a:t>Lead/Developer</a:t>
-            </a:r>
-            <a:endParaRPr lang="en-US" dirty="0"/>
-          </a:p>
-          <a:p>
-            <a:r>
-              <a:rPr lang="en-US" b="1" dirty="0"/>
-              <a:t>Tommy Parnell</a:t>
-            </a:r>
-            <a:r>
-              <a:rPr lang="en-US" dirty="0"/>
-              <a:t>: Development </a:t>
-            </a:r>
+              <a:t>Defined set of Project Risks </a:t>
+            </a:r>
+          </a:p>
+          <a:p>
+            <a:pPr lvl="1"/>
             <a:r>
               <a:rPr lang="en-US" dirty="0" smtClean="0"/>
-              <a:t>Lead/Documentation</a:t>
-            </a:r>
-            <a:endParaRPr lang="en-US" dirty="0"/>
-          </a:p>
-          <a:p>
-            <a:r>
-              <a:rPr lang="en-US" b="1" dirty="0"/>
-              <a:t>James Ruiz</a:t>
-            </a:r>
-            <a:r>
-              <a:rPr lang="en-US" dirty="0"/>
-              <a:t>: </a:t>
-            </a:r>
+              <a:t>Target Platforms and Data Interop</a:t>
+            </a:r>
+          </a:p>
+          <a:p>
+            <a:pPr lvl="1"/>
             <a:r>
               <a:rPr lang="en-US" dirty="0" smtClean="0"/>
-              <a:t>Developer/Tester </a:t>
-            </a:r>
-            <a:r>
-              <a:rPr lang="en-US" b="1" dirty="0" smtClean="0"/>
-              <a:t>Narrator 1</a:t>
-            </a:r>
-            <a:endParaRPr lang="en-US" dirty="0"/>
-          </a:p>
-          <a:p>
-            <a:endParaRPr lang="en-US" b="1" dirty="0"/>
+              <a:t>Initial App Full Stack Development</a:t>
+            </a:r>
+          </a:p>
+          <a:p>
+            <a:pPr lvl="1"/>
+            <a:r>
+              <a:rPr lang="en-US" dirty="0" smtClean="0"/>
+              <a:t>Problem Item(s) List</a:t>
+            </a:r>
           </a:p>
         </p:txBody>
       </p:sp>
     </p:spTree>
-    <p:extLst>
-      <p:ext uri="{BB962C8B-B14F-4D97-AF65-F5344CB8AC3E}">
-        <p14:creationId xmlns:p14="http://schemas.microsoft.com/office/powerpoint/2010/main" val="3761678171"/>
-      </p:ext>
-    </p:extLst>
+    <p:custDataLst>
+      <p:tags r:id="rId1"/>
+    </p:custDataLst>
   </p:cSld>
   <p:clrMapOvr>
     <a:masterClrMapping/>

</xml_diff>